<commit_message>
Uploaded data and presentation
</commit_message>
<xml_diff>
--- a/Præsentation_exam.pptx
+++ b/Præsentation_exam.pptx
@@ -8,10 +8,11 @@
     <p:sldId id="256" r:id="rId2"/>
     <p:sldId id="262" r:id="rId3"/>
     <p:sldId id="258" r:id="rId4"/>
-    <p:sldId id="259" r:id="rId5"/>
-    <p:sldId id="260" r:id="rId6"/>
-    <p:sldId id="257" r:id="rId7"/>
-    <p:sldId id="261" r:id="rId8"/>
+    <p:sldId id="263" r:id="rId5"/>
+    <p:sldId id="259" r:id="rId6"/>
+    <p:sldId id="260" r:id="rId7"/>
+    <p:sldId id="257" r:id="rId8"/>
+    <p:sldId id="261" r:id="rId9"/>
   </p:sldIdLst>
   <p:sldSz cx="12192000" cy="6858000"/>
   <p:notesSz cx="6858000" cy="9144000"/>
@@ -1024,7 +1025,7 @@
           <a:p>
             <a:fld id="{4B5B4FDD-3281-F341-88F4-917A87B2AFB8}" type="datetimeFigureOut">
               <a:rPr lang="da-DK" smtClean="0"/>
-              <a:t>24-05-2023</a:t>
+              <a:t>30.05.2023</a:t>
             </a:fld>
             <a:endParaRPr lang="da-DK"/>
           </a:p>
@@ -1222,7 +1223,7 @@
           <a:p>
             <a:fld id="{4B5B4FDD-3281-F341-88F4-917A87B2AFB8}" type="datetimeFigureOut">
               <a:rPr lang="da-DK" smtClean="0"/>
-              <a:t>24-05-2023</a:t>
+              <a:t>30.05.2023</a:t>
             </a:fld>
             <a:endParaRPr lang="da-DK"/>
           </a:p>
@@ -1430,7 +1431,7 @@
           <a:p>
             <a:fld id="{4B5B4FDD-3281-F341-88F4-917A87B2AFB8}" type="datetimeFigureOut">
               <a:rPr lang="da-DK" smtClean="0"/>
-              <a:t>24-05-2023</a:t>
+              <a:t>30.05.2023</a:t>
             </a:fld>
             <a:endParaRPr lang="da-DK"/>
           </a:p>
@@ -1628,7 +1629,7 @@
           <a:p>
             <a:fld id="{4B5B4FDD-3281-F341-88F4-917A87B2AFB8}" type="datetimeFigureOut">
               <a:rPr lang="da-DK" smtClean="0"/>
-              <a:t>24-05-2023</a:t>
+              <a:t>30.05.2023</a:t>
             </a:fld>
             <a:endParaRPr lang="da-DK"/>
           </a:p>
@@ -1903,7 +1904,7 @@
           <a:p>
             <a:fld id="{4B5B4FDD-3281-F341-88F4-917A87B2AFB8}" type="datetimeFigureOut">
               <a:rPr lang="da-DK" smtClean="0"/>
-              <a:t>24-05-2023</a:t>
+              <a:t>30.05.2023</a:t>
             </a:fld>
             <a:endParaRPr lang="da-DK"/>
           </a:p>
@@ -2168,7 +2169,7 @@
           <a:p>
             <a:fld id="{4B5B4FDD-3281-F341-88F4-917A87B2AFB8}" type="datetimeFigureOut">
               <a:rPr lang="da-DK" smtClean="0"/>
-              <a:t>24-05-2023</a:t>
+              <a:t>30.05.2023</a:t>
             </a:fld>
             <a:endParaRPr lang="da-DK"/>
           </a:p>
@@ -2580,7 +2581,7 @@
           <a:p>
             <a:fld id="{4B5B4FDD-3281-F341-88F4-917A87B2AFB8}" type="datetimeFigureOut">
               <a:rPr lang="da-DK" smtClean="0"/>
-              <a:t>24-05-2023</a:t>
+              <a:t>30.05.2023</a:t>
             </a:fld>
             <a:endParaRPr lang="da-DK"/>
           </a:p>
@@ -2721,7 +2722,7 @@
           <a:p>
             <a:fld id="{4B5B4FDD-3281-F341-88F4-917A87B2AFB8}" type="datetimeFigureOut">
               <a:rPr lang="da-DK" smtClean="0"/>
-              <a:t>24-05-2023</a:t>
+              <a:t>30.05.2023</a:t>
             </a:fld>
             <a:endParaRPr lang="da-DK"/>
           </a:p>
@@ -2834,7 +2835,7 @@
           <a:p>
             <a:fld id="{4B5B4FDD-3281-F341-88F4-917A87B2AFB8}" type="datetimeFigureOut">
               <a:rPr lang="da-DK" smtClean="0"/>
-              <a:t>24-05-2023</a:t>
+              <a:t>30.05.2023</a:t>
             </a:fld>
             <a:endParaRPr lang="da-DK"/>
           </a:p>
@@ -3145,7 +3146,7 @@
           <a:p>
             <a:fld id="{4B5B4FDD-3281-F341-88F4-917A87B2AFB8}" type="datetimeFigureOut">
               <a:rPr lang="da-DK" smtClean="0"/>
-              <a:t>24-05-2023</a:t>
+              <a:t>30.05.2023</a:t>
             </a:fld>
             <a:endParaRPr lang="da-DK"/>
           </a:p>
@@ -3433,7 +3434,7 @@
           <a:p>
             <a:fld id="{4B5B4FDD-3281-F341-88F4-917A87B2AFB8}" type="datetimeFigureOut">
               <a:rPr lang="da-DK" smtClean="0"/>
-              <a:t>24-05-2023</a:t>
+              <a:t>30.05.2023</a:t>
             </a:fld>
             <a:endParaRPr lang="da-DK"/>
           </a:p>
@@ -3674,7 +3675,7 @@
           <a:p>
             <a:fld id="{4B5B4FDD-3281-F341-88F4-917A87B2AFB8}" type="datetimeFigureOut">
               <a:rPr lang="da-DK" smtClean="0"/>
-              <a:t>24-05-2023</a:t>
+              <a:t>30.05.2023</a:t>
             </a:fld>
             <a:endParaRPr lang="da-DK"/>
           </a:p>
@@ -5042,7 +5043,7 @@
           <p:cNvPr id="2" name="Titel 1">
             <a:extLst>
               <a:ext uri="{FF2B5EF4-FFF2-40B4-BE49-F238E27FC236}">
-                <a16:creationId xmlns:a16="http://schemas.microsoft.com/office/drawing/2014/main" id="{3A4A851F-DC30-7A80-6888-349415862C45}"/>
+                <a16:creationId xmlns:a16="http://schemas.microsoft.com/office/drawing/2014/main" id="{E4FECF88-4F46-89F8-31D9-9485CDFD2917}"/>
               </a:ext>
             </a:extLst>
           </p:cNvPr>
@@ -5059,12 +5060,10 @@
           <a:lstStyle/>
           <a:p>
             <a:r>
-              <a:rPr lang="da-DK" dirty="0">
-                <a:latin typeface="Times New Roman" panose="02020603050405020304" pitchFamily="18" charset="0"/>
-                <a:cs typeface="Times New Roman" panose="02020603050405020304" pitchFamily="18" charset="0"/>
-              </a:rPr>
-              <a:t>Trend</a:t>
-            </a:r>
+              <a:rPr lang="da-DK" dirty="0" err="1"/>
+              <a:t>Stationarity</a:t>
+            </a:r>
+            <a:endParaRPr lang="da-DK" dirty="0"/>
           </a:p>
         </p:txBody>
       </p:sp>
@@ -5073,7 +5072,7 @@
           <p:cNvPr id="3" name="Pladsholder til indhold 2">
             <a:extLst>
               <a:ext uri="{FF2B5EF4-FFF2-40B4-BE49-F238E27FC236}">
-                <a16:creationId xmlns:a16="http://schemas.microsoft.com/office/drawing/2014/main" id="{1266BBEC-BC12-EDF2-5B3D-11037F0F8C90}"/>
+                <a16:creationId xmlns:a16="http://schemas.microsoft.com/office/drawing/2014/main" id="{9E7FB24D-B2ED-7B6A-BA11-FDACF7E87CB8}"/>
               </a:ext>
             </a:extLst>
           </p:cNvPr>
@@ -5096,7 +5095,7 @@
     </p:spTree>
     <p:extLst>
       <p:ext uri="{BB962C8B-B14F-4D97-AF65-F5344CB8AC3E}">
-        <p14:creationId xmlns:p14="http://schemas.microsoft.com/office/powerpoint/2010/main" val="3452730050"/>
+        <p14:creationId xmlns:p14="http://schemas.microsoft.com/office/powerpoint/2010/main" val="3068237003"/>
       </p:ext>
     </p:extLst>
   </p:cSld>
@@ -5128,7 +5127,7 @@
           <p:cNvPr id="2" name="Titel 1">
             <a:extLst>
               <a:ext uri="{FF2B5EF4-FFF2-40B4-BE49-F238E27FC236}">
-                <a16:creationId xmlns:a16="http://schemas.microsoft.com/office/drawing/2014/main" id="{54AC52B9-5604-42AC-F8EB-3521D1EAAFA2}"/>
+                <a16:creationId xmlns:a16="http://schemas.microsoft.com/office/drawing/2014/main" id="{3A4A851F-DC30-7A80-6888-349415862C45}"/>
               </a:ext>
             </a:extLst>
           </p:cNvPr>
@@ -5145,16 +5144,12 @@
           <a:lstStyle/>
           <a:p>
             <a:r>
-              <a:rPr lang="da-DK" dirty="0" err="1">
+              <a:rPr lang="da-DK" dirty="0">
                 <a:latin typeface="Times New Roman" panose="02020603050405020304" pitchFamily="18" charset="0"/>
                 <a:cs typeface="Times New Roman" panose="02020603050405020304" pitchFamily="18" charset="0"/>
               </a:rPr>
-              <a:t>Seasonality</a:t>
-            </a:r>
-            <a:endParaRPr lang="da-DK" dirty="0">
-              <a:latin typeface="Times New Roman" panose="02020603050405020304" pitchFamily="18" charset="0"/>
-              <a:cs typeface="Times New Roman" panose="02020603050405020304" pitchFamily="18" charset="0"/>
-            </a:endParaRPr>
+              <a:t>Trend</a:t>
+            </a:r>
           </a:p>
         </p:txBody>
       </p:sp>
@@ -5163,7 +5158,7 @@
           <p:cNvPr id="3" name="Pladsholder til indhold 2">
             <a:extLst>
               <a:ext uri="{FF2B5EF4-FFF2-40B4-BE49-F238E27FC236}">
-                <a16:creationId xmlns:a16="http://schemas.microsoft.com/office/drawing/2014/main" id="{9A84A67A-CB70-0B9F-D586-849001A76D57}"/>
+                <a16:creationId xmlns:a16="http://schemas.microsoft.com/office/drawing/2014/main" id="{1266BBEC-BC12-EDF2-5B3D-11037F0F8C90}"/>
               </a:ext>
             </a:extLst>
           </p:cNvPr>
@@ -5186,7 +5181,7 @@
     </p:spTree>
     <p:extLst>
       <p:ext uri="{BB962C8B-B14F-4D97-AF65-F5344CB8AC3E}">
-        <p14:creationId xmlns:p14="http://schemas.microsoft.com/office/powerpoint/2010/main" val="3922123492"/>
+        <p14:creationId xmlns:p14="http://schemas.microsoft.com/office/powerpoint/2010/main" val="3452730050"/>
       </p:ext>
     </p:extLst>
   </p:cSld>
@@ -5218,7 +5213,7 @@
           <p:cNvPr id="2" name="Titel 1">
             <a:extLst>
               <a:ext uri="{FF2B5EF4-FFF2-40B4-BE49-F238E27FC236}">
-                <a16:creationId xmlns:a16="http://schemas.microsoft.com/office/drawing/2014/main" id="{354B08C9-B480-8EDD-006E-C6D05D653EC7}"/>
+                <a16:creationId xmlns:a16="http://schemas.microsoft.com/office/drawing/2014/main" id="{54AC52B9-5604-42AC-F8EB-3521D1EAAFA2}"/>
               </a:ext>
             </a:extLst>
           </p:cNvPr>
@@ -5239,7 +5234,7 @@
                 <a:latin typeface="Times New Roman" panose="02020603050405020304" pitchFamily="18" charset="0"/>
                 <a:cs typeface="Times New Roman" panose="02020603050405020304" pitchFamily="18" charset="0"/>
               </a:rPr>
-              <a:t>Forecasting</a:t>
+              <a:t>Seasonality</a:t>
             </a:r>
             <a:endParaRPr lang="da-DK" dirty="0">
               <a:latin typeface="Times New Roman" panose="02020603050405020304" pitchFamily="18" charset="0"/>
@@ -5253,7 +5248,7 @@
           <p:cNvPr id="3" name="Pladsholder til indhold 2">
             <a:extLst>
               <a:ext uri="{FF2B5EF4-FFF2-40B4-BE49-F238E27FC236}">
-                <a16:creationId xmlns:a16="http://schemas.microsoft.com/office/drawing/2014/main" id="{DE7E4B27-9145-9B32-E3B9-FD09544CDBF5}"/>
+                <a16:creationId xmlns:a16="http://schemas.microsoft.com/office/drawing/2014/main" id="{9A84A67A-CB70-0B9F-D586-849001A76D57}"/>
               </a:ext>
             </a:extLst>
           </p:cNvPr>
@@ -5266,27 +5261,64 @@
         </p:nvSpPr>
         <p:spPr>
           <a:xfrm>
-            <a:off x="838200" y="1825625"/>
-            <a:ext cx="5525779" cy="4351338"/>
+            <a:off x="838200" y="1690687"/>
+            <a:ext cx="4765158" cy="4486275"/>
           </a:xfrm>
         </p:spPr>
         <p:txBody>
           <a:bodyPr/>
           <a:lstStyle/>
           <a:p>
-            <a:pPr marL="0" indent="0">
-              <a:buNone/>
-            </a:pPr>
-            <a:endParaRPr lang="da-DK" dirty="0"/>
+            <a:r>
+              <a:rPr lang="da-DK" dirty="0">
+                <a:latin typeface="Times New Roman" panose="02020603050405020304" pitchFamily="18" charset="0"/>
+                <a:cs typeface="Times New Roman" panose="02020603050405020304" pitchFamily="18" charset="0"/>
+              </a:rPr>
+              <a:t>Fjern/fang </a:t>
+            </a:r>
+            <a:r>
+              <a:rPr lang="da-DK" dirty="0" err="1">
+                <a:latin typeface="Times New Roman" panose="02020603050405020304" pitchFamily="18" charset="0"/>
+                <a:cs typeface="Times New Roman" panose="02020603050405020304" pitchFamily="18" charset="0"/>
+              </a:rPr>
+              <a:t>seasonality</a:t>
+            </a:r>
+            <a:r>
+              <a:rPr lang="da-DK" dirty="0">
+                <a:latin typeface="Times New Roman" panose="02020603050405020304" pitchFamily="18" charset="0"/>
+                <a:cs typeface="Times New Roman" panose="02020603050405020304" pitchFamily="18" charset="0"/>
+              </a:rPr>
+              <a:t> for at forbedre prædiktionsevne</a:t>
+            </a:r>
+          </a:p>
+          <a:p>
+            <a:r>
+              <a:rPr lang="da-DK" dirty="0">
+                <a:latin typeface="Times New Roman" panose="02020603050405020304" pitchFamily="18" charset="0"/>
+                <a:cs typeface="Times New Roman" panose="02020603050405020304" pitchFamily="18" charset="0"/>
+              </a:rPr>
+              <a:t>Timelig, dagligt, månedligt </a:t>
+            </a:r>
+            <a:r>
+              <a:rPr lang="da-DK" dirty="0" err="1">
+                <a:latin typeface="Times New Roman" panose="02020603050405020304" pitchFamily="18" charset="0"/>
+                <a:cs typeface="Times New Roman" panose="02020603050405020304" pitchFamily="18" charset="0"/>
+              </a:rPr>
+              <a:t>seasonality</a:t>
+            </a:r>
+            <a:endParaRPr lang="da-DK" dirty="0">
+              <a:latin typeface="Times New Roman" panose="02020603050405020304" pitchFamily="18" charset="0"/>
+              <a:cs typeface="Times New Roman" panose="02020603050405020304" pitchFamily="18" charset="0"/>
+            </a:endParaRPr>
           </a:p>
         </p:txBody>
       </p:sp>
       <p:pic>
         <p:nvPicPr>
-          <p:cNvPr id="7" name="Billede 6">
-            <a:extLst>
-              <a:ext uri="{FF2B5EF4-FFF2-40B4-BE49-F238E27FC236}">
-                <a16:creationId xmlns:a16="http://schemas.microsoft.com/office/drawing/2014/main" id="{6898CD29-2D12-052D-1B05-40F2001DE668}"/>
+          <p:cNvPr id="4" name="Billede 3">
+            <a:extLst>
+              <a:ext uri="{FF2B5EF4-FFF2-40B4-BE49-F238E27FC236}">
+                <a16:creationId xmlns:a16="http://schemas.microsoft.com/office/drawing/2014/main" id="{345281D3-DECA-675D-8280-A562BFBE7D99}"/>
               </a:ext>
             </a:extLst>
           </p:cNvPr>
@@ -5303,8 +5335,68 @@
         </p:blipFill>
         <p:spPr>
           <a:xfrm>
-            <a:off x="6621451" y="1825625"/>
-            <a:ext cx="4732350" cy="4351338"/>
+            <a:off x="6986461" y="365125"/>
+            <a:ext cx="4320000" cy="3159696"/>
+          </a:xfrm>
+          <a:prstGeom prst="rect">
+            <a:avLst/>
+          </a:prstGeom>
+        </p:spPr>
+      </p:pic>
+      <p:pic>
+        <p:nvPicPr>
+          <p:cNvPr id="5" name="Billede 4">
+            <a:extLst>
+              <a:ext uri="{FF2B5EF4-FFF2-40B4-BE49-F238E27FC236}">
+                <a16:creationId xmlns:a16="http://schemas.microsoft.com/office/drawing/2014/main" id="{F15DCF76-80E9-4ED1-62BD-44A2345205AC}"/>
+              </a:ext>
+            </a:extLst>
+          </p:cNvPr>
+          <p:cNvPicPr>
+            <a:picLocks noChangeAspect="1"/>
+          </p:cNvPicPr>
+          <p:nvPr/>
+        </p:nvPicPr>
+        <p:blipFill>
+          <a:blip r:embed="rId3"/>
+          <a:stretch>
+            <a:fillRect/>
+          </a:stretch>
+        </p:blipFill>
+        <p:spPr>
+          <a:xfrm>
+            <a:off x="7033800" y="3524821"/>
+            <a:ext cx="4320000" cy="3168882"/>
+          </a:xfrm>
+          <a:prstGeom prst="rect">
+            <a:avLst/>
+          </a:prstGeom>
+        </p:spPr>
+      </p:pic>
+      <p:pic>
+        <p:nvPicPr>
+          <p:cNvPr id="6" name="Billede 5">
+            <a:extLst>
+              <a:ext uri="{FF2B5EF4-FFF2-40B4-BE49-F238E27FC236}">
+                <a16:creationId xmlns:a16="http://schemas.microsoft.com/office/drawing/2014/main" id="{DEEBB827-472E-6EA0-D204-05F679E30671}"/>
+              </a:ext>
+            </a:extLst>
+          </p:cNvPr>
+          <p:cNvPicPr>
+            <a:picLocks noChangeAspect="1"/>
+          </p:cNvPicPr>
+          <p:nvPr/>
+        </p:nvPicPr>
+        <p:blipFill>
+          <a:blip r:embed="rId4"/>
+          <a:stretch>
+            <a:fillRect/>
+          </a:stretch>
+        </p:blipFill>
+        <p:spPr>
+          <a:xfrm>
+            <a:off x="1121735" y="3429000"/>
+            <a:ext cx="4198088" cy="2968741"/>
           </a:xfrm>
           <a:prstGeom prst="rect">
             <a:avLst/>
@@ -5314,7 +5406,7 @@
     </p:spTree>
     <p:extLst>
       <p:ext uri="{BB962C8B-B14F-4D97-AF65-F5344CB8AC3E}">
-        <p14:creationId xmlns:p14="http://schemas.microsoft.com/office/powerpoint/2010/main" val="2506765863"/>
+        <p14:creationId xmlns:p14="http://schemas.microsoft.com/office/powerpoint/2010/main" val="3922123492"/>
       </p:ext>
     </p:extLst>
   </p:cSld>
@@ -5346,6 +5438,287 @@
           <p:cNvPr id="2" name="Titel 1">
             <a:extLst>
               <a:ext uri="{FF2B5EF4-FFF2-40B4-BE49-F238E27FC236}">
+                <a16:creationId xmlns:a16="http://schemas.microsoft.com/office/drawing/2014/main" id="{354B08C9-B480-8EDD-006E-C6D05D653EC7}"/>
+              </a:ext>
+            </a:extLst>
+          </p:cNvPr>
+          <p:cNvSpPr>
+            <a:spLocks noGrp="1"/>
+          </p:cNvSpPr>
+          <p:nvPr>
+            <p:ph type="title"/>
+          </p:nvPr>
+        </p:nvSpPr>
+        <p:spPr/>
+        <p:txBody>
+          <a:bodyPr/>
+          <a:lstStyle/>
+          <a:p>
+            <a:r>
+              <a:rPr lang="da-DK" dirty="0" err="1">
+                <a:latin typeface="Times New Roman" panose="02020603050405020304" pitchFamily="18" charset="0"/>
+                <a:cs typeface="Times New Roman" panose="02020603050405020304" pitchFamily="18" charset="0"/>
+              </a:rPr>
+              <a:t>Forecasting</a:t>
+            </a:r>
+            <a:endParaRPr lang="da-DK" dirty="0">
+              <a:latin typeface="Times New Roman" panose="02020603050405020304" pitchFamily="18" charset="0"/>
+              <a:cs typeface="Times New Roman" panose="02020603050405020304" pitchFamily="18" charset="0"/>
+            </a:endParaRPr>
+          </a:p>
+        </p:txBody>
+      </p:sp>
+      <p:pic>
+        <p:nvPicPr>
+          <p:cNvPr id="4" name="Pladsholder til indhold 3">
+            <a:extLst>
+              <a:ext uri="{FF2B5EF4-FFF2-40B4-BE49-F238E27FC236}">
+                <a16:creationId xmlns:a16="http://schemas.microsoft.com/office/drawing/2014/main" id="{7F8DAFB4-4B65-05BB-4C2D-01577188A679}"/>
+              </a:ext>
+            </a:extLst>
+          </p:cNvPr>
+          <p:cNvPicPr>
+            <a:picLocks noGrp="1" noChangeAspect="1"/>
+          </p:cNvPicPr>
+          <p:nvPr>
+            <p:ph idx="1"/>
+          </p:nvPr>
+        </p:nvPicPr>
+        <p:blipFill rotWithShape="1">
+          <a:blip r:embed="rId2"/>
+          <a:srcRect l="-1" r="1768"/>
+          <a:stretch/>
+        </p:blipFill>
+        <p:spPr>
+          <a:xfrm>
+            <a:off x="835508" y="1593242"/>
+            <a:ext cx="3330682" cy="2340000"/>
+          </a:xfrm>
+          <a:prstGeom prst="rect">
+            <a:avLst/>
+          </a:prstGeom>
+        </p:spPr>
+      </p:pic>
+      <p:pic>
+        <p:nvPicPr>
+          <p:cNvPr id="7" name="Billede 6">
+            <a:extLst>
+              <a:ext uri="{FF2B5EF4-FFF2-40B4-BE49-F238E27FC236}">
+                <a16:creationId xmlns:a16="http://schemas.microsoft.com/office/drawing/2014/main" id="{6898CD29-2D12-052D-1B05-40F2001DE668}"/>
+              </a:ext>
+            </a:extLst>
+          </p:cNvPr>
+          <p:cNvPicPr>
+            <a:picLocks noChangeAspect="1"/>
+          </p:cNvPicPr>
+          <p:nvPr/>
+        </p:nvPicPr>
+        <p:blipFill>
+          <a:blip r:embed="rId3"/>
+          <a:stretch>
+            <a:fillRect/>
+          </a:stretch>
+        </p:blipFill>
+        <p:spPr>
+          <a:xfrm>
+            <a:off x="6621450" y="1027906"/>
+            <a:ext cx="4732350" cy="4351338"/>
+          </a:xfrm>
+          <a:prstGeom prst="rect">
+            <a:avLst/>
+          </a:prstGeom>
+        </p:spPr>
+      </p:pic>
+      <p:pic>
+        <p:nvPicPr>
+          <p:cNvPr id="5" name="Billede 4">
+            <a:extLst>
+              <a:ext uri="{FF2B5EF4-FFF2-40B4-BE49-F238E27FC236}">
+                <a16:creationId xmlns:a16="http://schemas.microsoft.com/office/drawing/2014/main" id="{D4D4C4C4-DE6B-110E-277F-CF70A6A747AD}"/>
+              </a:ext>
+            </a:extLst>
+          </p:cNvPr>
+          <p:cNvPicPr>
+            <a:picLocks noChangeAspect="1"/>
+          </p:cNvPicPr>
+          <p:nvPr/>
+        </p:nvPicPr>
+        <p:blipFill rotWithShape="1">
+          <a:blip r:embed="rId4"/>
+          <a:srcRect t="360" r="1872" b="-469"/>
+          <a:stretch/>
+        </p:blipFill>
+        <p:spPr>
+          <a:xfrm>
+            <a:off x="838199" y="4088126"/>
+            <a:ext cx="3300109" cy="2340000"/>
+          </a:xfrm>
+          <a:prstGeom prst="rect">
+            <a:avLst/>
+          </a:prstGeom>
+        </p:spPr>
+      </p:pic>
+      <p:sp>
+        <p:nvSpPr>
+          <p:cNvPr id="6" name="Tekstfelt 5">
+            <a:extLst>
+              <a:ext uri="{FF2B5EF4-FFF2-40B4-BE49-F238E27FC236}">
+                <a16:creationId xmlns:a16="http://schemas.microsoft.com/office/drawing/2014/main" id="{30A395C3-2E6A-4185-9626-533EEFFF13A7}"/>
+              </a:ext>
+            </a:extLst>
+          </p:cNvPr>
+          <p:cNvSpPr txBox="1"/>
+          <p:nvPr/>
+        </p:nvSpPr>
+        <p:spPr>
+          <a:xfrm>
+            <a:off x="838200" y="1407544"/>
+            <a:ext cx="3327990" cy="461665"/>
+          </a:xfrm>
+          <a:prstGeom prst="rect">
+            <a:avLst/>
+          </a:prstGeom>
+          <a:noFill/>
+        </p:spPr>
+        <p:txBody>
+          <a:bodyPr wrap="square" rtlCol="0">
+            <a:spAutoFit/>
+          </a:bodyPr>
+          <a:lstStyle/>
+          <a:p>
+            <a:r>
+              <a:rPr lang="da-DK" sz="1200" dirty="0">
+                <a:latin typeface="Times New Roman" panose="02020603050405020304" pitchFamily="18" charset="0"/>
+                <a:cs typeface="Times New Roman" panose="02020603050405020304" pitchFamily="18" charset="0"/>
+              </a:rPr>
+              <a:t>SARIMA(24, 1, 1)(7, 0, 1)(24) </a:t>
+            </a:r>
+          </a:p>
+          <a:p>
+            <a:r>
+              <a:rPr lang="da-DK" sz="1200" dirty="0">
+                <a:latin typeface="Times New Roman" panose="02020603050405020304" pitchFamily="18" charset="0"/>
+                <a:cs typeface="Times New Roman" panose="02020603050405020304" pitchFamily="18" charset="0"/>
+              </a:rPr>
+              <a:t>RMSE: 344.0</a:t>
+            </a:r>
+          </a:p>
+        </p:txBody>
+      </p:sp>
+      <p:sp>
+        <p:nvSpPr>
+          <p:cNvPr id="8" name="Tekstfelt 7">
+            <a:extLst>
+              <a:ext uri="{FF2B5EF4-FFF2-40B4-BE49-F238E27FC236}">
+                <a16:creationId xmlns:a16="http://schemas.microsoft.com/office/drawing/2014/main" id="{A4E6894D-98C4-ECEA-E68E-E371BDB0410F}"/>
+              </a:ext>
+            </a:extLst>
+          </p:cNvPr>
+          <p:cNvSpPr txBox="1"/>
+          <p:nvPr/>
+        </p:nvSpPr>
+        <p:spPr>
+          <a:xfrm>
+            <a:off x="838199" y="3841940"/>
+            <a:ext cx="6025116" cy="461665"/>
+          </a:xfrm>
+          <a:prstGeom prst="rect">
+            <a:avLst/>
+          </a:prstGeom>
+          <a:noFill/>
+        </p:spPr>
+        <p:txBody>
+          <a:bodyPr wrap="square" rtlCol="0">
+            <a:spAutoFit/>
+          </a:bodyPr>
+          <a:lstStyle/>
+          <a:p>
+            <a:r>
+              <a:rPr lang="da-DK" sz="1200" dirty="0">
+                <a:latin typeface="Times New Roman" panose="02020603050405020304" pitchFamily="18" charset="0"/>
+                <a:cs typeface="Times New Roman" panose="02020603050405020304" pitchFamily="18" charset="0"/>
+              </a:rPr>
+              <a:t>SARIMA(24, 1, 1)(7, 0, 1)(24) + weekend + vind + fossil + biomasse + affald + handel</a:t>
+            </a:r>
+          </a:p>
+          <a:p>
+            <a:r>
+              <a:rPr lang="da-DK" sz="1200" dirty="0">
+                <a:latin typeface="Times New Roman" panose="02020603050405020304" pitchFamily="18" charset="0"/>
+                <a:cs typeface="Times New Roman" panose="02020603050405020304" pitchFamily="18" charset="0"/>
+              </a:rPr>
+              <a:t>RMSE: 263.9</a:t>
+            </a:r>
+          </a:p>
+        </p:txBody>
+      </p:sp>
+      <p:sp>
+        <p:nvSpPr>
+          <p:cNvPr id="9" name="Tekstfelt 8">
+            <a:extLst>
+              <a:ext uri="{FF2B5EF4-FFF2-40B4-BE49-F238E27FC236}">
+                <a16:creationId xmlns:a16="http://schemas.microsoft.com/office/drawing/2014/main" id="{E4A2D42B-068F-E7E1-5608-E13C7C4CF8FA}"/>
+              </a:ext>
+            </a:extLst>
+          </p:cNvPr>
+          <p:cNvSpPr txBox="1"/>
+          <p:nvPr/>
+        </p:nvSpPr>
+        <p:spPr>
+          <a:xfrm>
+            <a:off x="6621450" y="5603358"/>
+            <a:ext cx="4732350" cy="691116"/>
+          </a:xfrm>
+          <a:prstGeom prst="rect">
+            <a:avLst/>
+          </a:prstGeom>
+          <a:noFill/>
+        </p:spPr>
+        <p:txBody>
+          <a:bodyPr wrap="square" rtlCol="0">
+            <a:spAutoFit/>
+          </a:bodyPr>
+          <a:lstStyle/>
+          <a:p>
+            <a:endParaRPr lang="da-DK" dirty="0"/>
+          </a:p>
+        </p:txBody>
+      </p:sp>
+    </p:spTree>
+    <p:extLst>
+      <p:ext uri="{BB962C8B-B14F-4D97-AF65-F5344CB8AC3E}">
+        <p14:creationId xmlns:p14="http://schemas.microsoft.com/office/powerpoint/2010/main" val="2506765863"/>
+      </p:ext>
+    </p:extLst>
+  </p:cSld>
+  <p:clrMapOvr>
+    <a:masterClrMapping/>
+  </p:clrMapOvr>
+</p:sld>
+</file>
+
+<file path=ppt/slides/slide8.xml><?xml version="1.0" encoding="utf-8"?>
+<p:sld xmlns:a="http://schemas.openxmlformats.org/drawingml/2006/main" xmlns:r="http://schemas.openxmlformats.org/officeDocument/2006/relationships" xmlns:p="http://schemas.openxmlformats.org/presentationml/2006/main">
+  <p:cSld>
+    <p:spTree>
+      <p:nvGrpSpPr>
+        <p:cNvPr id="1" name=""/>
+        <p:cNvGrpSpPr/>
+        <p:nvPr/>
+      </p:nvGrpSpPr>
+      <p:grpSpPr>
+        <a:xfrm>
+          <a:off x="0" y="0"/>
+          <a:ext cx="0" cy="0"/>
+          <a:chOff x="0" y="0"/>
+          <a:chExt cx="0" cy="0"/>
+        </a:xfrm>
+      </p:grpSpPr>
+      <p:sp>
+        <p:nvSpPr>
+          <p:cNvPr id="2" name="Titel 1">
+            <a:extLst>
+              <a:ext uri="{FF2B5EF4-FFF2-40B4-BE49-F238E27FC236}">
                 <a16:creationId xmlns:a16="http://schemas.microsoft.com/office/drawing/2014/main" id="{FFA66FE6-3D0F-2194-1E89-8E5235D82B73}"/>
               </a:ext>
             </a:extLst>
@@ -5372,31 +5745,96 @@
           </a:p>
         </p:txBody>
       </p:sp>
-      <p:sp>
-        <p:nvSpPr>
-          <p:cNvPr id="3" name="Pladsholder til indhold 2">
-            <a:extLst>
-              <a:ext uri="{FF2B5EF4-FFF2-40B4-BE49-F238E27FC236}">
-                <a16:creationId xmlns:a16="http://schemas.microsoft.com/office/drawing/2014/main" id="{F4743FAE-8BCA-7BEA-6FDE-B0C77FD123E3}"/>
-              </a:ext>
-            </a:extLst>
-          </p:cNvPr>
-          <p:cNvSpPr>
-            <a:spLocks noGrp="1"/>
-          </p:cNvSpPr>
-          <p:nvPr>
-            <p:ph idx="1"/>
-          </p:nvPr>
-        </p:nvSpPr>
-        <p:spPr/>
-        <p:txBody>
-          <a:bodyPr/>
-          <a:lstStyle/>
-          <a:p>
-            <a:endParaRPr lang="da-DK"/>
-          </a:p>
-        </p:txBody>
-      </p:sp>
+      <p:pic>
+        <p:nvPicPr>
+          <p:cNvPr id="6" name="Billede 5">
+            <a:extLst>
+              <a:ext uri="{FF2B5EF4-FFF2-40B4-BE49-F238E27FC236}">
+                <a16:creationId xmlns:a16="http://schemas.microsoft.com/office/drawing/2014/main" id="{512E695C-EF65-892B-DCDB-8EA3A7AE4389}"/>
+              </a:ext>
+            </a:extLst>
+          </p:cNvPr>
+          <p:cNvPicPr>
+            <a:picLocks noChangeAspect="1"/>
+          </p:cNvPicPr>
+          <p:nvPr/>
+        </p:nvPicPr>
+        <p:blipFill>
+          <a:blip r:embed="rId2"/>
+          <a:stretch>
+            <a:fillRect/>
+          </a:stretch>
+        </p:blipFill>
+        <p:spPr>
+          <a:xfrm>
+            <a:off x="5681331" y="4130426"/>
+            <a:ext cx="5400000" cy="2278125"/>
+          </a:xfrm>
+          <a:prstGeom prst="rect">
+            <a:avLst/>
+          </a:prstGeom>
+        </p:spPr>
+      </p:pic>
+      <p:pic>
+        <p:nvPicPr>
+          <p:cNvPr id="7" name="Billede 6">
+            <a:extLst>
+              <a:ext uri="{FF2B5EF4-FFF2-40B4-BE49-F238E27FC236}">
+                <a16:creationId xmlns:a16="http://schemas.microsoft.com/office/drawing/2014/main" id="{F4C04E62-BC21-D684-2F6F-E16D6AB479BB}"/>
+              </a:ext>
+            </a:extLst>
+          </p:cNvPr>
+          <p:cNvPicPr>
+            <a:picLocks noChangeAspect="1"/>
+          </p:cNvPicPr>
+          <p:nvPr/>
+        </p:nvPicPr>
+        <p:blipFill>
+          <a:blip r:embed="rId3"/>
+          <a:stretch>
+            <a:fillRect/>
+          </a:stretch>
+        </p:blipFill>
+        <p:spPr>
+          <a:xfrm>
+            <a:off x="892431" y="1316225"/>
+            <a:ext cx="4321421" cy="5094000"/>
+          </a:xfrm>
+          <a:prstGeom prst="rect">
+            <a:avLst/>
+          </a:prstGeom>
+        </p:spPr>
+      </p:pic>
+      <p:pic>
+        <p:nvPicPr>
+          <p:cNvPr id="8" name="Billede 7">
+            <a:extLst>
+              <a:ext uri="{FF2B5EF4-FFF2-40B4-BE49-F238E27FC236}">
+                <a16:creationId xmlns:a16="http://schemas.microsoft.com/office/drawing/2014/main" id="{71EEC4C6-F335-F7D3-EA48-65045EB744ED}"/>
+              </a:ext>
+            </a:extLst>
+          </p:cNvPr>
+          <p:cNvPicPr>
+            <a:picLocks noChangeAspect="1"/>
+          </p:cNvPicPr>
+          <p:nvPr/>
+        </p:nvPicPr>
+        <p:blipFill>
+          <a:blip r:embed="rId4"/>
+          <a:stretch>
+            <a:fillRect/>
+          </a:stretch>
+        </p:blipFill>
+        <p:spPr>
+          <a:xfrm>
+            <a:off x="5681331" y="1316226"/>
+            <a:ext cx="4320000" cy="2376944"/>
+          </a:xfrm>
+          <a:prstGeom prst="rect">
+            <a:avLst/>
+          </a:prstGeom>
+        </p:spPr>
+      </p:pic>
     </p:spTree>
     <p:extLst>
       <p:ext uri="{BB962C8B-B14F-4D97-AF65-F5344CB8AC3E}">

</xml_diff>